<commit_message>
Updating docs and powerpoints
</commit_message>
<xml_diff>
--- a/docs/Shabbir_Suterwala_Week2Demo.pptx
+++ b/docs/Shabbir_Suterwala_Week2Demo.pptx
@@ -3136,7 +3136,9 @@
           <a:lstStyle/>
           <a:p>
             <a:r>
-              <a:rPr lang="en-US" dirty="0" err="1" smtClean="0"/>
+              <a:rPr lang="en-US" dirty="0" smtClean="0">
+                <a:hlinkClick r:id="rId2"/>
+              </a:rPr>
               <a:t>HawkEye</a:t>
             </a:r>
             <a:r>
@@ -3148,7 +3150,11 @@
             </a:br>
             <a:r>
               <a:rPr lang="en-US" sz="2000" dirty="0" smtClean="0"/>
-              <a:t>Performance Monitoring Solution for Data Centers</a:t>
+              <a:t>Performance Monitoring Solution for Data </a:t>
+            </a:r>
+            <a:r>
+              <a:rPr lang="en-US" sz="2000" dirty="0" smtClean="0"/>
+              <a:t>Centers</a:t>
             </a:r>
             <a:endParaRPr lang="en-US" dirty="0"/>
           </a:p>
@@ -3229,7 +3235,7 @@
           <a:lstStyle/>
           <a:p>
             <a:r>
-              <a:rPr lang="en-US" dirty="0" err="1" smtClean="0"/>
+              <a:rPr lang="en-US" dirty="0" smtClean="0"/>
               <a:t>HawkEye</a:t>
             </a:r>
             <a:endParaRPr lang="en-US" dirty="0"/>
@@ -3397,11 +3403,7 @@
           <a:p>
             <a:r>
               <a:rPr lang="en-US" dirty="0" smtClean="0"/>
-              <a:t>Data </a:t>
-            </a:r>
-            <a:r>
-              <a:rPr lang="en-US" dirty="0" smtClean="0"/>
-              <a:t>Points; time stamped:</a:t>
+              <a:t>Data Points; time stamped:</a:t>
             </a:r>
           </a:p>
           <a:p>
@@ -3487,11 +3489,7 @@
           <a:p>
             <a:r>
               <a:rPr lang="en-US" dirty="0" smtClean="0"/>
-              <a:t>Real </a:t>
-            </a:r>
-            <a:r>
-              <a:rPr lang="en-US" dirty="0" smtClean="0"/>
-              <a:t>World</a:t>
+              <a:t>Real World</a:t>
             </a:r>
           </a:p>
           <a:p>
@@ -3592,7 +3590,7 @@
         </p:spPr>
         <p:txBody>
           <a:bodyPr>
-            <a:normAutofit fontScale="77500" lnSpcReduction="20000"/>
+            <a:normAutofit fontScale="62500" lnSpcReduction="20000"/>
           </a:bodyPr>
           <a:lstStyle/>
           <a:p>
@@ -3613,6 +3611,23 @@
               <a:t>	</a:t>
             </a:r>
             <a:r>
+              <a:rPr lang="en-US" dirty="0" smtClean="0">
+                <a:solidFill>
+                  <a:srgbClr val="92D050"/>
+                </a:solidFill>
+              </a:rPr>
+              <a:t>//Timestamp in/out</a:t>
+            </a:r>
+          </a:p>
+          <a:p>
+            <a:pPr marL="0" indent="0">
+              <a:buNone/>
+            </a:pPr>
+            <a:r>
+              <a:rPr lang="en-US" dirty="0"/>
+              <a:t>	</a:t>
+            </a:r>
+            <a:r>
               <a:rPr lang="en-US" dirty="0" smtClean="0"/>
               <a:t>"</a:t>
             </a:r>
@@ -3624,6 +3639,7 @@
               <a:rPr lang="en-US" dirty="0"/>
               <a:t>": 1453407175613828, </a:t>
             </a:r>
+            <a:endParaRPr lang="en-US" dirty="0" smtClean="0"/>
           </a:p>
           <a:p>
             <a:pPr marL="0" indent="0">
@@ -3635,6 +3651,44 @@
             </a:r>
             <a:r>
               <a:rPr lang="en-US" dirty="0" err="1"/>
+              <a:t>TsOut</a:t>
+            </a:r>
+            <a:r>
+              <a:rPr lang="en-US" dirty="0"/>
+              <a:t>": 1453407175614662,</a:t>
+            </a:r>
+          </a:p>
+          <a:p>
+            <a:pPr marL="0" indent="0">
+              <a:buNone/>
+            </a:pPr>
+            <a:r>
+              <a:rPr lang="en-US" dirty="0" smtClean="0"/>
+              <a:t>	</a:t>
+            </a:r>
+            <a:r>
+              <a:rPr lang="en-US" dirty="0" smtClean="0">
+                <a:solidFill>
+                  <a:srgbClr val="92D050"/>
+                </a:solidFill>
+              </a:rPr>
+              <a:t>//Monitors:</a:t>
+            </a:r>
+          </a:p>
+          <a:p>
+            <a:pPr marL="0" indent="0">
+              <a:buNone/>
+            </a:pPr>
+            <a:r>
+              <a:rPr lang="en-US" dirty="0"/>
+              <a:t>	</a:t>
+            </a:r>
+            <a:r>
+              <a:rPr lang="en-US" dirty="0" smtClean="0"/>
+              <a:t>"</a:t>
+            </a:r>
+            <a:r>
+              <a:rPr lang="en-US" dirty="0" err="1"/>
               <a:t>SwType</a:t>
             </a:r>
             <a:r>
@@ -3709,6 +3763,7 @@
               <a:rPr lang="en-US" dirty="0"/>
               <a:t>": "HWTYPE48", </a:t>
             </a:r>
+            <a:endParaRPr lang="en-US" dirty="0" smtClean="0"/>
           </a:p>
           <a:p>
             <a:pPr marL="0" indent="0">
@@ -3719,12 +3774,12 @@
               <a:t>	"</a:t>
             </a:r>
             <a:r>
-              <a:rPr lang="en-US" dirty="0" err="1"/>
-              <a:t>TsOut</a:t>
-            </a:r>
-            <a:r>
-              <a:rPr lang="en-US" dirty="0"/>
-              <a:t>": 1453407175614662, </a:t>
+              <a:rPr lang="en-US" dirty="0" err="1" smtClean="0"/>
+              <a:t>TaskID</a:t>
+            </a:r>
+            <a:r>
+              <a:rPr lang="en-US" dirty="0" smtClean="0"/>
+              <a:t>": "TASKID154", </a:t>
             </a:r>
           </a:p>
           <a:p>
@@ -3737,12 +3792,13 @@
             </a:r>
             <a:r>
               <a:rPr lang="en-US" dirty="0" err="1"/>
-              <a:t>TaskID</a:t>
+              <a:t>AppID</a:t>
             </a:r>
             <a:r>
               <a:rPr lang="en-US" dirty="0"/>
-              <a:t>": "TASKID154", </a:t>
-            </a:r>
+              <a:t>": "HawkEye", </a:t>
+            </a:r>
+            <a:endParaRPr lang="en-US" dirty="0" smtClean="0"/>
           </a:p>
           <a:p>
             <a:pPr marL="0" indent="0">
@@ -3750,24 +3806,21 @@
             </a:pPr>
             <a:r>
               <a:rPr lang="en-US" dirty="0" smtClean="0"/>
-              <a:t>	"</a:t>
-            </a:r>
-            <a:r>
-              <a:rPr lang="en-US" dirty="0" err="1"/>
-              <a:t>AppID</a:t>
-            </a:r>
-            <a:r>
-              <a:rPr lang="en-US" dirty="0"/>
-              <a:t>": "</a:t>
-            </a:r>
-            <a:r>
-              <a:rPr lang="en-US" dirty="0" err="1"/>
-              <a:t>HawkEye</a:t>
-            </a:r>
-            <a:r>
-              <a:rPr lang="en-US" dirty="0"/>
-              <a:t>", </a:t>
-            </a:r>
+              <a:t>	</a:t>
+            </a:r>
+            <a:r>
+              <a:rPr lang="en-US" dirty="0" smtClean="0">
+                <a:solidFill>
+                  <a:srgbClr val="92D050"/>
+                </a:solidFill>
+              </a:rPr>
+              <a:t>//Track packets across the network</a:t>
+            </a:r>
+            <a:endParaRPr lang="en-US" dirty="0">
+              <a:solidFill>
+                <a:srgbClr val="92D050"/>
+              </a:solidFill>
+            </a:endParaRPr>
           </a:p>
           <a:p>
             <a:pPr marL="0" indent="0">
@@ -3945,11 +3998,7 @@
             <a:pPr lvl="1" fontAlgn="base"/>
             <a:r>
               <a:rPr lang="en-US" sz="2000" dirty="0" smtClean="0"/>
-              <a:t>Which </a:t>
-            </a:r>
-            <a:r>
-              <a:rPr lang="en-US" sz="2000" dirty="0" smtClean="0"/>
-              <a:t>N hardware, software, app combination produce bottlenecks and where.</a:t>
+              <a:t>Which N hardware, software, app combination produce bottlenecks and where.</a:t>
             </a:r>
           </a:p>
         </p:txBody>

</xml_diff>